<commit_message>
fix ppt presentation file
</commit_message>
<xml_diff>
--- a/polysat.pptx
+++ b/polysat.pptx
@@ -181,6 +181,9 @@
           </p14:sldIdLst>
         </p14:section>
       </p14:sectionLst>
+    </p:ext>
+    <p:ext uri="{EFAFB233-063F-42B5-8137-9DF3F51BA10A}">
+      <p15:sldGuideLst xmlns:p15="http://schemas.microsoft.com/office/powerpoint/2012/main"/>
     </p:ext>
   </p:extLst>
 </p:presentation>
@@ -378,7 +381,7 @@
     </inkml:brush>
   </inkml:definitions>
   <inkml:trace contextRef="#ctx0" brushRef="#br0">2890 202,'-26'12,"4"-5,-1-1,0-2,0 0,-1-2,1 0,-21-2,20 1,-642-1,607-1,19 0,0 1,1 2,-38 7,17 6,1 3,1 3,1 2,-25 15,51-23,2 1,0 1,1 2,0 2,-29 43,28-26,24-31,1 0,0 0,0 0,1 0,0 1,0-1,1 1,0 0,0 0,1-1,0 1,0 7,-9 40,3-31,1 0,2 0,0 0,2 1,0 0,-9 239,12-112,0-142,2 0,-1-1,1 1,1-1,0 1,0-1,1 0,0-1,0 1,1-1,0 0,1 0,0-1,1 1,-1 0,3 6,1-1,0 0,1-1,0 0,1-1,1 0,-1-1,2-1,-1 0,1-1,1 0,-1-1,1-1,1-1,10 2,92 24,18 1,0-23,-48-4,80 15,-80-4,0-3,1-5,28-2,-112-6,1-1,-1 0,0 0,0-1,0 0,0 0,0 0,0 0,0-1,-1 0,1 0,-1-1,0 0,0 0,0 0,-1 0,3-4,68-62,17-16,-80 73,-1-1,-1 0,0-1,-1 0,0-1,-1 0,-1 0,-1 0,0-1,1-9,16-39,-16 41,-1-1,-1 0,-1 0,-1 0,-2 0,0 0,-2 0,-2-13,2-31,0-144,0 203,-1 1,0 0,-1-1,0 1,0 0,-1 1,-3-8,-12-28,15 30</inkml:trace>
-  <inkml:trace contextRef="#ctx0" brushRef="#br1" timeOffset="12314.065">811 3,'-33'0,"19"-1,-1 0,1 1,-1 1,1 0,-1 1,1 0,0 1,0 1,0 0,1 1,-8 4,-56 27,-27 17,66-25,2 2,1 2,2 0,0 3,3 0,1 2,-7 14,-3 24,0 29,-2 65,35-137,-18 158,24 179,2-357,0 1,1-1,0 0,0-1,2 1,-1-1,2 1,-1-1,1-1,1 1,4 5,1 3,17 22,2-1,1-2,2-1,1-1,7 2,41 22,-74-54,1-1,-1 0,1 0,0-1,0 0,0 0,7 0,29 12,-20-8,0-2,0 0,0-2,1-1,0-1,-1-1,1-1,16-3,14 2,189 0,-241 1,-1 0,1-1,-1 0,0 0,0 0,1 0,-1-1,0 1,0-1,0 0,-1-1,1 1,3-3,7-4,87-28,-8 7,13-3,-101 30,-1 0,1 0,-1-1,1 1,-1-1,0-1,-1 1,1 0,-1-1,0 0,0 1,0-1,0-1,-1 1,0 0,0 0,-1-1,1 1,-1-1,0-5,57-138,-55 118,0 1,-2-1,-3-29,0 33,2 1,0 0,2-1,1 1,5-19,-8 43,8-24,-2 0,-1-1,-1 1,0-14,2-86,-3 80,-1 1,-2-1,-3 0,-1 0,-6-16,4 22,-3 0,-2 0,-8-19,-35-50,0 2,43 91,-1 0,0 0,0 1,-2 1,0 0,-1 1,0 1,0 0,-5-1,-52-18,58 26,0-1,0 2,0 0,-1 1,1 0,-1 2,0-1,0 2,1 0,-12 1,-270 0,280-1</inkml:trace>
+  <inkml:trace contextRef="#ctx0" brushRef="#br1" timeOffset="12314.064">811 3,'-33'0,"19"-1,-1 0,1 1,-1 1,1 0,-1 1,1 0,0 1,0 1,0 0,1 1,-8 4,-56 27,-27 17,66-25,2 2,1 2,2 0,0 3,3 0,1 2,-7 14,-3 24,0 29,-2 65,35-137,-18 158,24 179,2-357,0 1,1-1,0 0,0-1,2 1,-1-1,2 1,-1-1,1-1,1 1,4 5,1 3,17 22,2-1,1-2,2-1,1-1,7 2,41 22,-74-54,1-1,-1 0,1 0,0-1,0 0,0 0,7 0,29 12,-20-8,0-2,0 0,0-2,1-1,0-1,-1-1,1-1,16-3,14 2,189 0,-241 1,-1 0,1-1,-1 0,0 0,0 0,1 0,-1-1,0 1,0-1,0 0,-1-1,1 1,3-3,7-4,87-28,-8 7,13-3,-101 30,-1 0,1 0,-1-1,1 1,-1-1,0-1,-1 1,1 0,-1-1,0 0,0 1,0-1,0-1,-1 1,0 0,0 0,-1-1,1 1,-1-1,0-5,57-138,-55 118,0 1,-2-1,-3-29,0 33,2 1,0 0,2-1,1 1,5-19,-8 43,8-24,-2 0,-1-1,-1 1,0-14,2-86,-3 80,-1 1,-2-1,-3 0,-1 0,-6-16,4 22,-3 0,-2 0,-8-19,-35-50,0 2,43 91,-1 0,0 0,0 1,-2 1,0 0,-1 1,0 1,0 0,-5-1,-52-18,58 26,0-1,0 2,0 0,-1 1,1 0,-1 2,0-1,0 2,1 0,-12 1,-270 0,280-1</inkml:trace>
 </inkml:ink>
 </file>
 
@@ -840,7 +843,7 @@
           <a:p>
             <a:fld id="{3E202993-5086-4A6C-A0DF-7DA4E6664567}" type="datetimeFigureOut">
               <a:rPr lang="ru-RU" smtClean="0"/>
-              <a:t>06.10.2021</a:t>
+              <a:t>07.10.2021</a:t>
             </a:fld>
             <a:endParaRPr lang="ru-RU"/>
           </a:p>
@@ -1038,7 +1041,7 @@
           <a:p>
             <a:fld id="{3E202993-5086-4A6C-A0DF-7DA4E6664567}" type="datetimeFigureOut">
               <a:rPr lang="ru-RU" smtClean="0"/>
-              <a:t>06.10.2021</a:t>
+              <a:t>07.10.2021</a:t>
             </a:fld>
             <a:endParaRPr lang="ru-RU"/>
           </a:p>
@@ -1246,7 +1249,7 @@
           <a:p>
             <a:fld id="{3E202993-5086-4A6C-A0DF-7DA4E6664567}" type="datetimeFigureOut">
               <a:rPr lang="ru-RU" smtClean="0"/>
-              <a:t>06.10.2021</a:t>
+              <a:t>07.10.2021</a:t>
             </a:fld>
             <a:endParaRPr lang="ru-RU"/>
           </a:p>
@@ -1444,7 +1447,7 @@
           <a:p>
             <a:fld id="{3E202993-5086-4A6C-A0DF-7DA4E6664567}" type="datetimeFigureOut">
               <a:rPr lang="ru-RU" smtClean="0"/>
-              <a:t>06.10.2021</a:t>
+              <a:t>07.10.2021</a:t>
             </a:fld>
             <a:endParaRPr lang="ru-RU"/>
           </a:p>
@@ -1719,7 +1722,7 @@
           <a:p>
             <a:fld id="{3E202993-5086-4A6C-A0DF-7DA4E6664567}" type="datetimeFigureOut">
               <a:rPr lang="ru-RU" smtClean="0"/>
-              <a:t>06.10.2021</a:t>
+              <a:t>07.10.2021</a:t>
             </a:fld>
             <a:endParaRPr lang="ru-RU"/>
           </a:p>
@@ -1984,7 +1987,7 @@
           <a:p>
             <a:fld id="{3E202993-5086-4A6C-A0DF-7DA4E6664567}" type="datetimeFigureOut">
               <a:rPr lang="ru-RU" smtClean="0"/>
-              <a:t>06.10.2021</a:t>
+              <a:t>07.10.2021</a:t>
             </a:fld>
             <a:endParaRPr lang="ru-RU"/>
           </a:p>
@@ -2396,7 +2399,7 @@
           <a:p>
             <a:fld id="{3E202993-5086-4A6C-A0DF-7DA4E6664567}" type="datetimeFigureOut">
               <a:rPr lang="ru-RU" smtClean="0"/>
-              <a:t>06.10.2021</a:t>
+              <a:t>07.10.2021</a:t>
             </a:fld>
             <a:endParaRPr lang="ru-RU"/>
           </a:p>
@@ -2537,7 +2540,7 @@
           <a:p>
             <a:fld id="{3E202993-5086-4A6C-A0DF-7DA4E6664567}" type="datetimeFigureOut">
               <a:rPr lang="ru-RU" smtClean="0"/>
-              <a:t>06.10.2021</a:t>
+              <a:t>07.10.2021</a:t>
             </a:fld>
             <a:endParaRPr lang="ru-RU"/>
           </a:p>
@@ -2650,7 +2653,7 @@
           <a:p>
             <a:fld id="{3E202993-5086-4A6C-A0DF-7DA4E6664567}" type="datetimeFigureOut">
               <a:rPr lang="ru-RU" smtClean="0"/>
-              <a:t>06.10.2021</a:t>
+              <a:t>07.10.2021</a:t>
             </a:fld>
             <a:endParaRPr lang="ru-RU"/>
           </a:p>
@@ -2961,7 +2964,7 @@
           <a:p>
             <a:fld id="{3E202993-5086-4A6C-A0DF-7DA4E6664567}" type="datetimeFigureOut">
               <a:rPr lang="ru-RU" smtClean="0"/>
-              <a:t>06.10.2021</a:t>
+              <a:t>07.10.2021</a:t>
             </a:fld>
             <a:endParaRPr lang="ru-RU"/>
           </a:p>
@@ -3249,7 +3252,7 @@
           <a:p>
             <a:fld id="{3E202993-5086-4A6C-A0DF-7DA4E6664567}" type="datetimeFigureOut">
               <a:rPr lang="ru-RU" smtClean="0"/>
-              <a:t>06.10.2021</a:t>
+              <a:t>07.10.2021</a:t>
             </a:fld>
             <a:endParaRPr lang="ru-RU"/>
           </a:p>
@@ -3490,7 +3493,7 @@
           <a:p>
             <a:fld id="{3E202993-5086-4A6C-A0DF-7DA4E6664567}" type="datetimeFigureOut">
               <a:rPr lang="ru-RU" smtClean="0"/>
-              <a:t>06.10.2021</a:t>
+              <a:t>07.10.2021</a:t>
             </a:fld>
             <a:endParaRPr lang="ru-RU"/>
           </a:p>
@@ -4238,7 +4241,7 @@
             </a:r>
             <a:r>
               <a:rPr lang="en-US" baseline="-25000" dirty="0"/>
-              <a:t>x1x2x4</a:t>
+              <a:t>x1x3x4</a:t>
             </a:r>
             <a:r>
               <a:rPr lang="en-US" dirty="0"/>
@@ -4246,7 +4249,7 @@
             </a:r>
             <a:r>
               <a:rPr lang="en-US" baseline="-25000" dirty="0"/>
-              <a:t>x1x2x4</a:t>
+              <a:t>x2x3x4</a:t>
             </a:r>
             <a:r>
               <a:rPr lang="en-US" dirty="0"/>
@@ -5016,7 +5019,7 @@
             </a:r>
             <a:r>
               <a:rPr lang="en-US" baseline="-25000" dirty="0"/>
-              <a:t>x1x2x4</a:t>
+              <a:t>x1x3x4</a:t>
             </a:r>
             <a:r>
               <a:rPr lang="en-US" dirty="0"/>
@@ -5024,7 +5027,7 @@
             </a:r>
             <a:r>
               <a:rPr lang="en-US" baseline="-25000" dirty="0"/>
-              <a:t>x1x2x4</a:t>
+              <a:t>x2x3x4</a:t>
             </a:r>
             <a:r>
               <a:rPr lang="en-US" dirty="0"/>
@@ -6492,7 +6495,7 @@
             </a:r>
             <a:r>
               <a:rPr lang="en-US" baseline="-25000" dirty="0"/>
-              <a:t>x1x2x4</a:t>
+              <a:t>x1x3x4</a:t>
             </a:r>
             <a:r>
               <a:rPr lang="en-US" dirty="0"/>
@@ -6500,7 +6503,7 @@
             </a:r>
             <a:r>
               <a:rPr lang="en-US" baseline="-25000" dirty="0"/>
-              <a:t>x1x2x4</a:t>
+              <a:t>x2x3x4</a:t>
             </a:r>
             <a:r>
               <a:rPr lang="en-US" dirty="0"/>
@@ -7288,7 +7291,7 @@
             </a:r>
             <a:r>
               <a:rPr lang="en-US" baseline="-25000" dirty="0"/>
-              <a:t>x1x2x4</a:t>
+              <a:t>x1x3x4</a:t>
             </a:r>
             <a:r>
               <a:rPr lang="en-US" dirty="0"/>
@@ -7296,7 +7299,7 @@
             </a:r>
             <a:r>
               <a:rPr lang="en-US" baseline="-25000" dirty="0"/>
-              <a:t>x1x2x4</a:t>
+              <a:t>x2x3x4</a:t>
             </a:r>
             <a:r>
               <a:rPr lang="en-US" dirty="0"/>
@@ -10093,8 +10096,8 @@
           </a:graphicData>
         </a:graphic>
       </p:graphicFrame>
-      <mc:AlternateContent xmlns:mc="http://schemas.openxmlformats.org/markup-compatibility/2006">
-        <mc:Choice xmlns:p14="http://schemas.microsoft.com/office/powerpoint/2010/main" Requires="p14">
+      <mc:AlternateContent xmlns:mc="http://schemas.openxmlformats.org/markup-compatibility/2006" xmlns:p14="http://schemas.microsoft.com/office/powerpoint/2010/main">
+        <mc:Choice Requires="p14">
           <p:contentPart p14:bwMode="auto" r:id="rId2">
             <p14:nvContentPartPr>
               <p14:cNvPr id="6" name="Рукописный ввод 5">
@@ -10113,7 +10116,7 @@
             </p14:xfrm>
           </p:contentPart>
         </mc:Choice>
-        <mc:Fallback>
+        <mc:Fallback xmlns="">
           <p:pic>
             <p:nvPicPr>
               <p:cNvPr id="6" name="Рукописный ввод 5">
@@ -11017,8 +11020,8 @@
           </a:graphicData>
         </a:graphic>
       </p:graphicFrame>
-      <mc:AlternateContent xmlns:mc="http://schemas.openxmlformats.org/markup-compatibility/2006">
-        <mc:Choice xmlns:p14="http://schemas.microsoft.com/office/powerpoint/2010/main" Requires="p14">
+      <mc:AlternateContent xmlns:mc="http://schemas.openxmlformats.org/markup-compatibility/2006" xmlns:p14="http://schemas.microsoft.com/office/powerpoint/2010/main">
+        <mc:Choice Requires="p14">
           <p:contentPart p14:bwMode="auto" r:id="rId2">
             <p14:nvContentPartPr>
               <p14:cNvPr id="4" name="Рукописный ввод 3">
@@ -11037,7 +11040,7 @@
             </p14:xfrm>
           </p:contentPart>
         </mc:Choice>
-        <mc:Fallback>
+        <mc:Fallback xmlns="">
           <p:pic>
             <p:nvPicPr>
               <p:cNvPr id="4" name="Рукописный ввод 3">
@@ -11068,8 +11071,8 @@
           </p:pic>
         </mc:Fallback>
       </mc:AlternateContent>
-      <mc:AlternateContent xmlns:mc="http://schemas.openxmlformats.org/markup-compatibility/2006">
-        <mc:Choice xmlns:p14="http://schemas.microsoft.com/office/powerpoint/2010/main" Requires="p14">
+      <mc:AlternateContent xmlns:mc="http://schemas.openxmlformats.org/markup-compatibility/2006" xmlns:p14="http://schemas.microsoft.com/office/powerpoint/2010/main">
+        <mc:Choice Requires="p14">
           <p:contentPart p14:bwMode="auto" r:id="rId4">
             <p14:nvContentPartPr>
               <p14:cNvPr id="7" name="Рукописный ввод 6">
@@ -11088,7 +11091,7 @@
             </p14:xfrm>
           </p:contentPart>
         </mc:Choice>
-        <mc:Fallback>
+        <mc:Fallback xmlns="">
           <p:pic>
             <p:nvPicPr>
               <p:cNvPr id="7" name="Рукописный ввод 6">
@@ -12049,8 +12052,8 @@
           </a:graphicData>
         </a:graphic>
       </p:graphicFrame>
-      <mc:AlternateContent xmlns:mc="http://schemas.openxmlformats.org/markup-compatibility/2006">
-        <mc:Choice xmlns:p14="http://schemas.microsoft.com/office/powerpoint/2010/main" Requires="p14">
+      <mc:AlternateContent xmlns:mc="http://schemas.openxmlformats.org/markup-compatibility/2006" xmlns:p14="http://schemas.microsoft.com/office/powerpoint/2010/main">
+        <mc:Choice Requires="p14">
           <p:contentPart p14:bwMode="auto" r:id="rId2">
             <p14:nvContentPartPr>
               <p14:cNvPr id="3" name="Рукописный ввод 2">
@@ -12069,7 +12072,7 @@
             </p14:xfrm>
           </p:contentPart>
         </mc:Choice>
-        <mc:Fallback>
+        <mc:Fallback xmlns="">
           <p:pic>
             <p:nvPicPr>
               <p:cNvPr id="3" name="Рукописный ввод 2">
@@ -13866,8 +13869,8 @@
           </a:graphicData>
         </a:graphic>
       </p:graphicFrame>
-      <mc:AlternateContent xmlns:mc="http://schemas.openxmlformats.org/markup-compatibility/2006">
-        <mc:Choice xmlns:p14="http://schemas.microsoft.com/office/powerpoint/2010/main" Requires="p14">
+      <mc:AlternateContent xmlns:mc="http://schemas.openxmlformats.org/markup-compatibility/2006" xmlns:p14="http://schemas.microsoft.com/office/powerpoint/2010/main">
+        <mc:Choice Requires="p14">
           <p:contentPart p14:bwMode="auto" r:id="rId2">
             <p14:nvContentPartPr>
               <p14:cNvPr id="6" name="Рукописный ввод 5">
@@ -13886,7 +13889,7 @@
             </p14:xfrm>
           </p:contentPart>
         </mc:Choice>
-        <mc:Fallback>
+        <mc:Fallback xmlns="">
           <p:pic>
             <p:nvPicPr>
               <p:cNvPr id="6" name="Рукописный ввод 5">
@@ -13917,8 +13920,8 @@
           </p:pic>
         </mc:Fallback>
       </mc:AlternateContent>
-      <mc:AlternateContent xmlns:mc="http://schemas.openxmlformats.org/markup-compatibility/2006">
-        <mc:Choice xmlns:p14="http://schemas.microsoft.com/office/powerpoint/2010/main" Requires="p14">
+      <mc:AlternateContent xmlns:mc="http://schemas.openxmlformats.org/markup-compatibility/2006" xmlns:p14="http://schemas.microsoft.com/office/powerpoint/2010/main">
+        <mc:Choice Requires="p14">
           <p:contentPart p14:bwMode="auto" r:id="rId4">
             <p14:nvContentPartPr>
               <p14:cNvPr id="7" name="Рукописный ввод 6">
@@ -13937,7 +13940,7 @@
             </p14:xfrm>
           </p:contentPart>
         </mc:Choice>
-        <mc:Fallback>
+        <mc:Fallback xmlns="">
           <p:pic>
             <p:nvPicPr>
               <p:cNvPr id="7" name="Рукописный ввод 6">
@@ -14810,8 +14813,8 @@
           </a:graphicData>
         </a:graphic>
       </p:graphicFrame>
-      <mc:AlternateContent xmlns:mc="http://schemas.openxmlformats.org/markup-compatibility/2006">
-        <mc:Choice xmlns:p14="http://schemas.microsoft.com/office/powerpoint/2010/main" Requires="p14">
+      <mc:AlternateContent xmlns:mc="http://schemas.openxmlformats.org/markup-compatibility/2006" xmlns:p14="http://schemas.microsoft.com/office/powerpoint/2010/main">
+        <mc:Choice Requires="p14">
           <p:contentPart p14:bwMode="auto" r:id="rId2">
             <p14:nvContentPartPr>
               <p14:cNvPr id="6" name="Рукописный ввод 5">
@@ -14830,7 +14833,7 @@
             </p14:xfrm>
           </p:contentPart>
         </mc:Choice>
-        <mc:Fallback>
+        <mc:Fallback xmlns="">
           <p:pic>
             <p:nvPicPr>
               <p:cNvPr id="6" name="Рукописный ввод 5">
@@ -15733,8 +15736,8 @@
           </a:graphicData>
         </a:graphic>
       </p:graphicFrame>
-      <mc:AlternateContent xmlns:mc="http://schemas.openxmlformats.org/markup-compatibility/2006">
-        <mc:Choice xmlns:p14="http://schemas.microsoft.com/office/powerpoint/2010/main" Requires="p14">
+      <mc:AlternateContent xmlns:mc="http://schemas.openxmlformats.org/markup-compatibility/2006" xmlns:p14="http://schemas.microsoft.com/office/powerpoint/2010/main">
+        <mc:Choice Requires="p14">
           <p:contentPart p14:bwMode="auto" r:id="rId2">
             <p14:nvContentPartPr>
               <p14:cNvPr id="4" name="Рукописный ввод 3">
@@ -15753,7 +15756,7 @@
             </p14:xfrm>
           </p:contentPart>
         </mc:Choice>
-        <mc:Fallback>
+        <mc:Fallback xmlns="">
           <p:pic>
             <p:nvPicPr>
               <p:cNvPr id="4" name="Рукописный ввод 3">
@@ -16648,8 +16651,8 @@
           </a:graphicData>
         </a:graphic>
       </p:graphicFrame>
-      <mc:AlternateContent xmlns:mc="http://schemas.openxmlformats.org/markup-compatibility/2006">
-        <mc:Choice xmlns:p14="http://schemas.microsoft.com/office/powerpoint/2010/main" Requires="p14">
+      <mc:AlternateContent xmlns:mc="http://schemas.openxmlformats.org/markup-compatibility/2006" xmlns:p14="http://schemas.microsoft.com/office/powerpoint/2010/main">
+        <mc:Choice Requires="p14">
           <p:contentPart p14:bwMode="auto" r:id="rId2">
             <p14:nvContentPartPr>
               <p14:cNvPr id="10" name="Рукописный ввод 9">
@@ -16668,7 +16671,7 @@
             </p14:xfrm>
           </p:contentPart>
         </mc:Choice>
-        <mc:Fallback>
+        <mc:Fallback xmlns="">
           <p:pic>
             <p:nvPicPr>
               <p:cNvPr id="10" name="Рукописный ввод 9">
@@ -17591,8 +17594,8 @@
           </a:graphicData>
         </a:graphic>
       </p:graphicFrame>
-      <mc:AlternateContent xmlns:mc="http://schemas.openxmlformats.org/markup-compatibility/2006">
-        <mc:Choice xmlns:p14="http://schemas.microsoft.com/office/powerpoint/2010/main" Requires="p14">
+      <mc:AlternateContent xmlns:mc="http://schemas.openxmlformats.org/markup-compatibility/2006" xmlns:p14="http://schemas.microsoft.com/office/powerpoint/2010/main">
+        <mc:Choice Requires="p14">
           <p:contentPart p14:bwMode="auto" r:id="rId2">
             <p14:nvContentPartPr>
               <p14:cNvPr id="6" name="Рукописный ввод 5">
@@ -17611,7 +17614,7 @@
             </p14:xfrm>
           </p:contentPart>
         </mc:Choice>
-        <mc:Fallback>
+        <mc:Fallback xmlns="">
           <p:pic>
             <p:nvPicPr>
               <p:cNvPr id="6" name="Рукописный ввод 5">
@@ -17642,8 +17645,8 @@
           </p:pic>
         </mc:Fallback>
       </mc:AlternateContent>
-      <mc:AlternateContent xmlns:mc="http://schemas.openxmlformats.org/markup-compatibility/2006">
-        <mc:Choice xmlns:p14="http://schemas.microsoft.com/office/powerpoint/2010/main" Requires="p14">
+      <mc:AlternateContent xmlns:mc="http://schemas.openxmlformats.org/markup-compatibility/2006" xmlns:p14="http://schemas.microsoft.com/office/powerpoint/2010/main">
+        <mc:Choice Requires="p14">
           <p:contentPart p14:bwMode="auto" r:id="rId4">
             <p14:nvContentPartPr>
               <p14:cNvPr id="7" name="Рукописный ввод 6">
@@ -17662,7 +17665,7 @@
             </p14:xfrm>
           </p:contentPart>
         </mc:Choice>
-        <mc:Fallback>
+        <mc:Fallback xmlns="">
           <p:pic>
             <p:nvPicPr>
               <p:cNvPr id="7" name="Рукописный ввод 6">
@@ -18759,8 +18762,8 @@
           </a:graphicData>
         </a:graphic>
       </p:graphicFrame>
-      <mc:AlternateContent xmlns:mc="http://schemas.openxmlformats.org/markup-compatibility/2006">
-        <mc:Choice xmlns:p14="http://schemas.microsoft.com/office/powerpoint/2010/main" Requires="p14">
+      <mc:AlternateContent xmlns:mc="http://schemas.openxmlformats.org/markup-compatibility/2006" xmlns:p14="http://schemas.microsoft.com/office/powerpoint/2010/main">
+        <mc:Choice Requires="p14">
           <p:contentPart p14:bwMode="auto" r:id="rId2">
             <p14:nvContentPartPr>
               <p14:cNvPr id="3" name="Рукописный ввод 2">
@@ -18779,7 +18782,7 @@
             </p14:xfrm>
           </p:contentPart>
         </mc:Choice>
-        <mc:Fallback>
+        <mc:Fallback xmlns="">
           <p:pic>
             <p:nvPicPr>
               <p:cNvPr id="3" name="Рукописный ввод 2">
@@ -18810,8 +18813,8 @@
           </p:pic>
         </mc:Fallback>
       </mc:AlternateContent>
-      <mc:AlternateContent xmlns:mc="http://schemas.openxmlformats.org/markup-compatibility/2006">
-        <mc:Choice xmlns:p14="http://schemas.microsoft.com/office/powerpoint/2010/main" Requires="p14">
+      <mc:AlternateContent xmlns:mc="http://schemas.openxmlformats.org/markup-compatibility/2006" xmlns:p14="http://schemas.microsoft.com/office/powerpoint/2010/main">
+        <mc:Choice Requires="p14">
           <p:contentPart p14:bwMode="auto" r:id="rId4">
             <p14:nvContentPartPr>
               <p14:cNvPr id="7" name="Рукописный ввод 6">
@@ -18830,7 +18833,7 @@
             </p14:xfrm>
           </p:contentPart>
         </mc:Choice>
-        <mc:Fallback>
+        <mc:Fallback xmlns="">
           <p:pic>
             <p:nvPicPr>
               <p:cNvPr id="7" name="Рукописный ввод 6">
@@ -20004,8 +20007,8 @@
           </a:graphicData>
         </a:graphic>
       </p:graphicFrame>
-      <mc:AlternateContent xmlns:mc="http://schemas.openxmlformats.org/markup-compatibility/2006">
-        <mc:Choice xmlns:p14="http://schemas.microsoft.com/office/powerpoint/2010/main" Requires="p14">
+      <mc:AlternateContent xmlns:mc="http://schemas.openxmlformats.org/markup-compatibility/2006" xmlns:p14="http://schemas.microsoft.com/office/powerpoint/2010/main">
+        <mc:Choice Requires="p14">
           <p:contentPart p14:bwMode="auto" r:id="rId2">
             <p14:nvContentPartPr>
               <p14:cNvPr id="8" name="Рукописный ввод 7">
@@ -20024,7 +20027,7 @@
             </p14:xfrm>
           </p:contentPart>
         </mc:Choice>
-        <mc:Fallback>
+        <mc:Fallback xmlns="">
           <p:pic>
             <p:nvPicPr>
               <p:cNvPr id="8" name="Рукописный ввод 7">
@@ -20055,8 +20058,8 @@
           </p:pic>
         </mc:Fallback>
       </mc:AlternateContent>
-      <mc:AlternateContent xmlns:mc="http://schemas.openxmlformats.org/markup-compatibility/2006">
-        <mc:Choice xmlns:p14="http://schemas.microsoft.com/office/powerpoint/2010/main" Requires="p14">
+      <mc:AlternateContent xmlns:mc="http://schemas.openxmlformats.org/markup-compatibility/2006" xmlns:p14="http://schemas.microsoft.com/office/powerpoint/2010/main">
+        <mc:Choice Requires="p14">
           <p:contentPart p14:bwMode="auto" r:id="rId4">
             <p14:nvContentPartPr>
               <p14:cNvPr id="10" name="Рукописный ввод 9">
@@ -20075,7 +20078,7 @@
             </p14:xfrm>
           </p:contentPart>
         </mc:Choice>
-        <mc:Fallback>
+        <mc:Fallback xmlns="">
           <p:pic>
             <p:nvPicPr>
               <p:cNvPr id="10" name="Рукописный ввод 9">
@@ -21289,8 +21292,8 @@
           </a:graphicData>
         </a:graphic>
       </p:graphicFrame>
-      <mc:AlternateContent xmlns:mc="http://schemas.openxmlformats.org/markup-compatibility/2006">
-        <mc:Choice xmlns:p14="http://schemas.microsoft.com/office/powerpoint/2010/main" Requires="p14">
+      <mc:AlternateContent xmlns:mc="http://schemas.openxmlformats.org/markup-compatibility/2006" xmlns:p14="http://schemas.microsoft.com/office/powerpoint/2010/main">
+        <mc:Choice Requires="p14">
           <p:contentPart p14:bwMode="auto" r:id="rId2">
             <p14:nvContentPartPr>
               <p14:cNvPr id="20" name="Рукописный ввод 19">
@@ -21309,7 +21312,7 @@
             </p14:xfrm>
           </p:contentPart>
         </mc:Choice>
-        <mc:Fallback>
+        <mc:Fallback xmlns="">
           <p:pic>
             <p:nvPicPr>
               <p:cNvPr id="20" name="Рукописный ввод 19">
@@ -27876,8 +27879,8 @@
           </a:p>
         </p:txBody>
       </p:sp>
-      <mc:AlternateContent xmlns:mc="http://schemas.openxmlformats.org/markup-compatibility/2006">
-        <mc:Choice xmlns:p14="http://schemas.microsoft.com/office/powerpoint/2010/main" Requires="p14">
+      <mc:AlternateContent xmlns:mc="http://schemas.openxmlformats.org/markup-compatibility/2006" xmlns:p14="http://schemas.microsoft.com/office/powerpoint/2010/main">
+        <mc:Choice Requires="p14">
           <p:contentPart p14:bwMode="auto" r:id="rId2">
             <p14:nvContentPartPr>
               <p14:cNvPr id="3" name="Рукописный ввод 2">
@@ -27896,7 +27899,7 @@
             </p14:xfrm>
           </p:contentPart>
         </mc:Choice>
-        <mc:Fallback>
+        <mc:Fallback xmlns="">
           <p:pic>
             <p:nvPicPr>
               <p:cNvPr id="3" name="Рукописный ввод 2">
@@ -27927,8 +27930,8 @@
           </p:pic>
         </mc:Fallback>
       </mc:AlternateContent>
-      <mc:AlternateContent xmlns:mc="http://schemas.openxmlformats.org/markup-compatibility/2006">
-        <mc:Choice xmlns:p14="http://schemas.microsoft.com/office/powerpoint/2010/main" Requires="p14">
+      <mc:AlternateContent xmlns:mc="http://schemas.openxmlformats.org/markup-compatibility/2006" xmlns:p14="http://schemas.microsoft.com/office/powerpoint/2010/main">
+        <mc:Choice Requires="p14">
           <p:contentPart p14:bwMode="auto" r:id="rId4">
             <p14:nvContentPartPr>
               <p14:cNvPr id="4" name="Рукописный ввод 3">
@@ -27947,7 +27950,7 @@
             </p14:xfrm>
           </p:contentPart>
         </mc:Choice>
-        <mc:Fallback>
+        <mc:Fallback xmlns="">
           <p:pic>
             <p:nvPicPr>
               <p:cNvPr id="4" name="Рукописный ввод 3">

</xml_diff>